<commit_message>
Delete previous pca result files
</commit_message>
<xml_diff>
--- a/PCA_pipeline/PCA result analysis.pptx
+++ b/PCA_pipeline/PCA result analysis.pptx
@@ -9,11 +9,12 @@
     <p:sldId id="257" r:id="rId4"/>
     <p:sldId id="258" r:id="rId5"/>
     <p:sldId id="259" r:id="rId6"/>
+    <p:sldId id="260" r:id="rId7"/>
   </p:sldIdLst>
   <p:sldSz cx="12192000" cy="6858000"/>
   <p:notesSz cx="6858000" cy="9144000"/>
   <p:custDataLst>
-    <p:tags r:id="rId10"/>
+    <p:tags r:id="rId11"/>
   </p:custDataLst>
   <p:defaultTextStyle>
     <a:defPPr>
@@ -3907,6 +3908,177 @@
 </p:sld>
 </file>
 
+<file path=ppt/slides/slide5.xml><?xml version="1.0" encoding="utf-8"?>
+<p:sld xmlns:a="http://schemas.openxmlformats.org/drawingml/2006/main" xmlns:r="http://schemas.openxmlformats.org/officeDocument/2006/relationships" xmlns:p="http://schemas.openxmlformats.org/presentationml/2006/main">
+  <p:cSld>
+    <p:spTree>
+      <p:nvGrpSpPr>
+        <p:cNvPr id="1" name=""/>
+        <p:cNvGrpSpPr/>
+        <p:nvPr/>
+      </p:nvGrpSpPr>
+      <p:grpSpPr/>
+      <p:sp>
+        <p:nvSpPr>
+          <p:cNvPr id="2" name="标题 1"/>
+          <p:cNvSpPr>
+            <a:spLocks noGrp="1"/>
+          </p:cNvSpPr>
+          <p:nvPr>
+            <p:ph type="title"/>
+          </p:nvPr>
+        </p:nvSpPr>
+        <p:spPr>
+          <a:xfrm>
+            <a:off x="666115" y="0"/>
+            <a:ext cx="10516235" cy="555625"/>
+          </a:xfrm>
+        </p:spPr>
+        <p:txBody>
+          <a:bodyPr>
+            <a:normAutofit/>
+          </a:bodyPr>
+          <a:p>
+            <a:pPr algn="ctr"/>
+            <a:r>
+              <a:rPr lang="en-US" altLang="zh-CN" sz="2000"/>
+              <a:t>Poland PCA results</a:t>
+            </a:r>
+            <a:endParaRPr lang="en-US" altLang="zh-CN" sz="2000"/>
+          </a:p>
+        </p:txBody>
+      </p:sp>
+      <p:pic>
+        <p:nvPicPr>
+          <p:cNvPr id="4" name="内容占位符 3"/>
+          <p:cNvPicPr>
+            <a:picLocks noChangeAspect="1"/>
+          </p:cNvPicPr>
+          <p:nvPr>
+            <p:ph idx="1"/>
+          </p:nvPr>
+        </p:nvPicPr>
+        <p:blipFill>
+          <a:blip r:embed="rId1"/>
+          <a:stretch>
+            <a:fillRect/>
+          </a:stretch>
+        </p:blipFill>
+        <p:spPr>
+          <a:xfrm>
+            <a:off x="426085" y="422910"/>
+            <a:ext cx="4512310" cy="3384550"/>
+          </a:xfrm>
+          <a:prstGeom prst="rect">
+            <a:avLst/>
+          </a:prstGeom>
+        </p:spPr>
+      </p:pic>
+      <p:pic>
+        <p:nvPicPr>
+          <p:cNvPr id="5" name="图片 4"/>
+          <p:cNvPicPr>
+            <a:picLocks noChangeAspect="1"/>
+          </p:cNvPicPr>
+          <p:nvPr/>
+        </p:nvPicPr>
+        <p:blipFill>
+          <a:blip r:embed="rId2"/>
+          <a:stretch>
+            <a:fillRect/>
+          </a:stretch>
+        </p:blipFill>
+        <p:spPr>
+          <a:xfrm>
+            <a:off x="6612255" y="423545"/>
+            <a:ext cx="4714240" cy="3383915"/>
+          </a:xfrm>
+          <a:prstGeom prst="rect">
+            <a:avLst/>
+          </a:prstGeom>
+        </p:spPr>
+      </p:pic>
+      <p:pic>
+        <p:nvPicPr>
+          <p:cNvPr id="6" name="图片 5"/>
+          <p:cNvPicPr>
+            <a:picLocks noChangeAspect="1"/>
+          </p:cNvPicPr>
+          <p:nvPr/>
+        </p:nvPicPr>
+        <p:blipFill>
+          <a:blip r:embed="rId3"/>
+          <a:stretch>
+            <a:fillRect/>
+          </a:stretch>
+        </p:blipFill>
+        <p:spPr>
+          <a:xfrm>
+            <a:off x="534035" y="3509645"/>
+            <a:ext cx="4424045" cy="3318510"/>
+          </a:xfrm>
+          <a:prstGeom prst="rect">
+            <a:avLst/>
+          </a:prstGeom>
+        </p:spPr>
+      </p:pic>
+      <p:pic>
+        <p:nvPicPr>
+          <p:cNvPr id="7" name="图片 6"/>
+          <p:cNvPicPr>
+            <a:picLocks noChangeAspect="1"/>
+          </p:cNvPicPr>
+          <p:nvPr/>
+        </p:nvPicPr>
+        <p:blipFill>
+          <a:blip r:embed="rId4"/>
+          <a:stretch>
+            <a:fillRect/>
+          </a:stretch>
+        </p:blipFill>
+        <p:spPr>
+          <a:xfrm>
+            <a:off x="6527800" y="3433445"/>
+            <a:ext cx="4798695" cy="3424555"/>
+          </a:xfrm>
+          <a:prstGeom prst="rect">
+            <a:avLst/>
+          </a:prstGeom>
+        </p:spPr>
+      </p:pic>
+      <p:sp>
+        <p:nvSpPr>
+          <p:cNvPr id="8" name="文本框 7"/>
+          <p:cNvSpPr txBox="1"/>
+          <p:nvPr/>
+        </p:nvSpPr>
+        <p:spPr>
+          <a:xfrm>
+            <a:off x="11440795" y="1886585"/>
+            <a:ext cx="4064000" cy="368300"/>
+          </a:xfrm>
+          <a:prstGeom prst="rect">
+            <a:avLst/>
+          </a:prstGeom>
+          <a:noFill/>
+        </p:spPr>
+        <p:txBody>
+          <a:bodyPr wrap="square" rtlCol="0">
+            <a:spAutoFit/>
+          </a:bodyPr>
+          <a:p>
+            <a:endParaRPr lang="zh-CN" altLang="en-US"/>
+          </a:p>
+        </p:txBody>
+      </p:sp>
+    </p:spTree>
+  </p:cSld>
+  <p:clrMapOvr>
+    <a:masterClrMapping/>
+  </p:clrMapOvr>
+</p:sld>
+</file>
+
 <file path=ppt/tags/tag1.xml><?xml version="1.0" encoding="utf-8"?>
 <p:tagLst xmlns:p="http://schemas.openxmlformats.org/presentationml/2006/main">
   <p:tag name="commondata" val="eyJoZGlkIjoiODZjM2FkZTgzNDNmMzMyNDFmN2ZhYzk0MWIyODc4YzIifQ=="/>

</xml_diff>